<commit_message>
chg: Corrected minor errors
</commit_message>
<xml_diff>
--- a/INTELLIGENCE/TGT_FOLDERS_PPT/SYTGT079 5th Corps Base.pptx
+++ b/INTELLIGENCE/TGT_FOLDERS_PPT/SYTGT079 5th Corps Base.pptx
@@ -110,7 +110,7 @@
   </p:defaultTextStyle>
   <p:extLst>
     <p:ext uri="{EFAFB233-063F-42B5-8137-9DF3F51BA10A}">
-      <p15:sldGuideLst xmlns:p15="http://schemas.microsoft.com/office/powerpoint/2012/main" xmlns="">
+      <p15:sldGuideLst xmlns="" xmlns:p15="http://schemas.microsoft.com/office/powerpoint/2012/main">
         <p15:guide id="1" orient="horz" pos="1620">
           <p15:clr>
             <a:srgbClr val="A4A3A4"/>
@@ -3894,7 +3894,7 @@
         </p:blipFill>
         <p:spPr bwMode="auto">
           <a:xfrm>
-            <a:off x="1187624" y="771550"/>
+            <a:off x="1187624" y="627534"/>
             <a:ext cx="3744416" cy="3830777"/>
           </a:xfrm>
           <a:prstGeom prst="rect">
@@ -3917,7 +3917,7 @@
         </p:nvSpPr>
         <p:spPr>
           <a:xfrm>
-            <a:off x="1819835" y="1059582"/>
+            <a:off x="1819835" y="915566"/>
             <a:ext cx="2196353" cy="3440700"/>
           </a:xfrm>
           <a:custGeom>
@@ -4179,7 +4179,7 @@
           <p:cNvPr id="66" name="Picture 2" descr="C:\Users\HARDC\Saved Games\DCS.openbeta\ScreenShots\Screen_200824_212755.png">
             <a:extLst>
               <a:ext uri="{FF2B5EF4-FFF2-40B4-BE49-F238E27FC236}">
-                <a16:creationId xmlns:a16="http://schemas.microsoft.com/office/drawing/2014/main" xmlns="" id="{00EE4CA1-3751-4688-AA6F-2F0555697605}"/>
+                <a16:creationId xmlns="" xmlns:a16="http://schemas.microsoft.com/office/drawing/2014/main" id="{00EE4CA1-3751-4688-AA6F-2F0555697605}"/>
               </a:ext>
             </a:extLst>
           </p:cNvPr>
@@ -4845,8 +4845,8 @@
         </p:nvSpPr>
         <p:spPr>
           <a:xfrm>
-            <a:off x="0" y="4515966"/>
-            <a:ext cx="5724128" cy="504056"/>
+            <a:off x="0" y="4443958"/>
+            <a:ext cx="5724128" cy="576064"/>
           </a:xfrm>
           <a:prstGeom prst="rect">
             <a:avLst/>
@@ -4864,14 +4864,28 @@
         </p:spPr>
         <p:txBody>
           <a:bodyPr wrap="square" rtlCol="0">
-            <a:normAutofit fontScale="92500" lnSpcReduction="20000"/>
+            <a:normAutofit fontScale="77500" lnSpcReduction="20000"/>
           </a:bodyPr>
           <a:lstStyle/>
           <a:p>
-            <a:pPr algn="ctr"/>
+            <a:r>
+              <a:rPr lang="en-US" sz="1200" b="1" dirty="0" smtClean="0"/>
+              <a:t>CDE Concern: </a:t>
+            </a:r>
+            <a:endParaRPr lang="en-US" sz="1200" b="1" dirty="0" smtClean="0"/>
+          </a:p>
+          <a:p>
+            <a:r>
+              <a:rPr lang="en-US" sz="1200" b="1" dirty="0" smtClean="0"/>
+              <a:t>- </a:t>
+            </a:r>
             <a:r>
               <a:rPr lang="en-US" sz="1200" dirty="0" smtClean="0"/>
-              <a:t>CDE Concern: Palmyra Castle (</a:t>
+              <a:t>Palmyra </a:t>
+            </a:r>
+            <a:r>
+              <a:rPr lang="en-US" sz="1200" dirty="0" smtClean="0"/>
+              <a:t>Castle (</a:t>
             </a:r>
             <a:r>
               <a:rPr lang="nb-NO" sz="1200" b="1" dirty="0" err="1" smtClean="0"/>
@@ -4955,10 +4969,13 @@
             </a:r>
           </a:p>
           <a:p>
-            <a:pPr algn="ctr"/>
+            <a:r>
+              <a:rPr lang="nb-NO" sz="1200" dirty="0" smtClean="0"/>
+              <a:t>- </a:t>
+            </a:r>
             <a:r>
               <a:rPr lang="nb-NO" sz="1200" dirty="0" err="1" smtClean="0"/>
-              <a:t>Closes</a:t>
+              <a:t>Closet</a:t>
             </a:r>
             <a:r>
               <a:rPr lang="nb-NO" sz="1200" dirty="0" smtClean="0"/>
@@ -5461,11 +5478,7 @@
           <a:p>
             <a:r>
               <a:rPr lang="nb-NO" sz="1100" dirty="0" smtClean="0"/>
-              <a:t>SYTGT079 </a:t>
-            </a:r>
-            <a:r>
-              <a:rPr lang="nb-NO" sz="1100" dirty="0" smtClean="0"/>
-              <a:t>A1-A3: </a:t>
+              <a:t>SYTGT079 A1-A3: </a:t>
             </a:r>
             <a:r>
               <a:rPr lang="nb-NO" sz="1100" dirty="0" err="1" smtClean="0"/>
@@ -5902,7 +5915,7 @@
                   <a:schemeClr val="tx1"/>
                 </a:solidFill>
               </a:rPr>
-              <a:t>075 </a:t>
+              <a:t>079 </a:t>
             </a:r>
             <a:r>
               <a:rPr lang="nb-NO" sz="1200" b="1" dirty="0" smtClean="0">
@@ -6017,7 +6030,7 @@
                   <a:schemeClr val="tx1"/>
                 </a:solidFill>
               </a:rPr>
-              <a:t>075 </a:t>
+              <a:t>079 </a:t>
             </a:r>
             <a:r>
               <a:rPr lang="nb-NO" sz="1200" b="1" dirty="0" smtClean="0">
@@ -6182,7 +6195,7 @@
                   <a:schemeClr val="tx1"/>
                 </a:solidFill>
               </a:rPr>
-              <a:t>075 </a:t>
+              <a:t>079 </a:t>
             </a:r>
             <a:r>
               <a:rPr lang="nb-NO" sz="1200" b="1" dirty="0" smtClean="0">
@@ -6527,7 +6540,7 @@
                   <a:schemeClr val="tx1"/>
                 </a:solidFill>
               </a:rPr>
-              <a:t>075 </a:t>
+              <a:t>079 </a:t>
             </a:r>
             <a:r>
               <a:rPr lang="nb-NO" sz="1200" b="1" dirty="0" smtClean="0">

</xml_diff>